<commit_message>
end of sept updates
</commit_message>
<xml_diff>
--- a/Documents/Flowchart 090920.pptx
+++ b/Documents/Flowchart 090920.pptx
@@ -254,7 +254,7 @@
           <a:p>
             <a:fld id="{42F1B69B-8D3A-44C3-946A-BB0D05283811}" type="datetimeFigureOut">
               <a:rPr lang="en-US" smtClean="0"/>
-              <a:t>9/9/2020</a:t>
+              <a:t>9/29/2020</a:t>
             </a:fld>
             <a:endParaRPr lang="en-US"/>
           </a:p>
@@ -424,7 +424,7 @@
           <a:p>
             <a:fld id="{42F1B69B-8D3A-44C3-946A-BB0D05283811}" type="datetimeFigureOut">
               <a:rPr lang="en-US" smtClean="0"/>
-              <a:t>9/9/2020</a:t>
+              <a:t>9/29/2020</a:t>
             </a:fld>
             <a:endParaRPr lang="en-US"/>
           </a:p>
@@ -604,7 +604,7 @@
           <a:p>
             <a:fld id="{42F1B69B-8D3A-44C3-946A-BB0D05283811}" type="datetimeFigureOut">
               <a:rPr lang="en-US" smtClean="0"/>
-              <a:t>9/9/2020</a:t>
+              <a:t>9/29/2020</a:t>
             </a:fld>
             <a:endParaRPr lang="en-US"/>
           </a:p>
@@ -774,7 +774,7 @@
           <a:p>
             <a:fld id="{42F1B69B-8D3A-44C3-946A-BB0D05283811}" type="datetimeFigureOut">
               <a:rPr lang="en-US" smtClean="0"/>
-              <a:t>9/9/2020</a:t>
+              <a:t>9/29/2020</a:t>
             </a:fld>
             <a:endParaRPr lang="en-US"/>
           </a:p>
@@ -1018,7 +1018,7 @@
           <a:p>
             <a:fld id="{42F1B69B-8D3A-44C3-946A-BB0D05283811}" type="datetimeFigureOut">
               <a:rPr lang="en-US" smtClean="0"/>
-              <a:t>9/9/2020</a:t>
+              <a:t>9/29/2020</a:t>
             </a:fld>
             <a:endParaRPr lang="en-US"/>
           </a:p>
@@ -1250,7 +1250,7 @@
           <a:p>
             <a:fld id="{42F1B69B-8D3A-44C3-946A-BB0D05283811}" type="datetimeFigureOut">
               <a:rPr lang="en-US" smtClean="0"/>
-              <a:t>9/9/2020</a:t>
+              <a:t>9/29/2020</a:t>
             </a:fld>
             <a:endParaRPr lang="en-US"/>
           </a:p>
@@ -1617,7 +1617,7 @@
           <a:p>
             <a:fld id="{42F1B69B-8D3A-44C3-946A-BB0D05283811}" type="datetimeFigureOut">
               <a:rPr lang="en-US" smtClean="0"/>
-              <a:t>9/9/2020</a:t>
+              <a:t>9/29/2020</a:t>
             </a:fld>
             <a:endParaRPr lang="en-US"/>
           </a:p>
@@ -1735,7 +1735,7 @@
           <a:p>
             <a:fld id="{42F1B69B-8D3A-44C3-946A-BB0D05283811}" type="datetimeFigureOut">
               <a:rPr lang="en-US" smtClean="0"/>
-              <a:t>9/9/2020</a:t>
+              <a:t>9/29/2020</a:t>
             </a:fld>
             <a:endParaRPr lang="en-US"/>
           </a:p>
@@ -1830,7 +1830,7 @@
           <a:p>
             <a:fld id="{42F1B69B-8D3A-44C3-946A-BB0D05283811}" type="datetimeFigureOut">
               <a:rPr lang="en-US" smtClean="0"/>
-              <a:t>9/9/2020</a:t>
+              <a:t>9/29/2020</a:t>
             </a:fld>
             <a:endParaRPr lang="en-US"/>
           </a:p>
@@ -2107,7 +2107,7 @@
           <a:p>
             <a:fld id="{42F1B69B-8D3A-44C3-946A-BB0D05283811}" type="datetimeFigureOut">
               <a:rPr lang="en-US" smtClean="0"/>
-              <a:t>9/9/2020</a:t>
+              <a:t>9/29/2020</a:t>
             </a:fld>
             <a:endParaRPr lang="en-US"/>
           </a:p>
@@ -2364,7 +2364,7 @@
           <a:p>
             <a:fld id="{42F1B69B-8D3A-44C3-946A-BB0D05283811}" type="datetimeFigureOut">
               <a:rPr lang="en-US" smtClean="0"/>
-              <a:t>9/9/2020</a:t>
+              <a:t>9/29/2020</a:t>
             </a:fld>
             <a:endParaRPr lang="en-US"/>
           </a:p>
@@ -2577,7 +2577,7 @@
           <a:p>
             <a:fld id="{42F1B69B-8D3A-44C3-946A-BB0D05283811}" type="datetimeFigureOut">
               <a:rPr lang="en-US" smtClean="0"/>
-              <a:t>9/9/2020</a:t>
+              <a:t>9/29/2020</a:t>
             </a:fld>
             <a:endParaRPr lang="en-US"/>
           </a:p>
@@ -3082,7 +3082,7 @@
         </p:nvSpPr>
         <p:spPr>
           <a:xfrm>
-            <a:off x="2254283" y="1405231"/>
+            <a:off x="2254283" y="2275818"/>
             <a:ext cx="2368868" cy="548640"/>
           </a:xfrm>
           <a:prstGeom prst="rect">
@@ -3126,7 +3126,7 @@
                 <a:latin typeface="Arial" panose="020B0604020202020204" pitchFamily="34" charset="0"/>
                 <a:cs typeface="Arial" panose="020B0604020202020204" pitchFamily="34" charset="0"/>
               </a:rPr>
-              <a:t>Women with complete biological age biomarker panel</a:t>
+              <a:t>Complete biological age biomarker panel</a:t>
             </a:r>
           </a:p>
           <a:p>
@@ -3149,7 +3149,7 @@
                 <a:latin typeface="Arial" panose="020B0604020202020204" pitchFamily="34" charset="0"/>
                 <a:cs typeface="Arial" panose="020B0604020202020204" pitchFamily="34" charset="0"/>
               </a:rPr>
-              <a:t> = 8,006</a:t>
+              <a:t> = 5,870</a:t>
             </a:r>
           </a:p>
         </p:txBody>
@@ -3168,7 +3168,7 @@
         </p:nvSpPr>
         <p:spPr>
           <a:xfrm>
-            <a:off x="2254283" y="2291727"/>
+            <a:off x="2244566" y="1420496"/>
             <a:ext cx="2368868" cy="548640"/>
           </a:xfrm>
           <a:prstGeom prst="rect">
@@ -3212,7 +3212,7 @@
                 <a:latin typeface="Arial" panose="020B0604020202020204" pitchFamily="34" charset="0"/>
                 <a:cs typeface="Arial" panose="020B0604020202020204" pitchFamily="34" charset="0"/>
               </a:rPr>
-              <a:t>Ages 18-84 and not currently pregnant</a:t>
+              <a:t>Women ages 18-84 and not currently pregnant</a:t>
             </a:r>
           </a:p>
           <a:p>
@@ -3235,7 +3235,7 @@
                 <a:latin typeface="Arial" panose="020B0604020202020204" pitchFamily="34" charset="0"/>
                 <a:cs typeface="Arial" panose="020B0604020202020204" pitchFamily="34" charset="0"/>
               </a:rPr>
-              <a:t> = 3,651</a:t>
+              <a:t> = 13,929</a:t>
             </a:r>
           </a:p>
         </p:txBody>
@@ -3319,7 +3319,7 @@
                 <a:latin typeface="Arial" panose="020B0604020202020204" pitchFamily="34" charset="0"/>
                 <a:cs typeface="Arial" panose="020B0604020202020204" pitchFamily="34" charset="0"/>
               </a:rPr>
-              <a:t> = 2,696</a:t>
+              <a:t> = 4,418</a:t>
             </a:r>
           </a:p>
           <a:p>
@@ -3540,7 +3540,7 @@
                 <a:latin typeface="Arial" panose="020B0604020202020204" pitchFamily="34" charset="0"/>
                 <a:cs typeface="Arial" panose="020B0604020202020204" pitchFamily="34" charset="0"/>
               </a:rPr>
-              <a:t>Zero to six live births reported</a:t>
+              <a:t>Zero to seven live births reported</a:t>
             </a:r>
           </a:p>
           <a:p>
@@ -3563,7 +3563,7 @@
                 <a:latin typeface="Arial" panose="020B0604020202020204" pitchFamily="34" charset="0"/>
                 <a:cs typeface="Arial" panose="020B0604020202020204" pitchFamily="34" charset="0"/>
               </a:rPr>
-              <a:t> = 3,235</a:t>
+              <a:t> = 5,184</a:t>
             </a:r>
           </a:p>
           <a:p>
@@ -3761,7 +3761,7 @@
                 <a:latin typeface="Arial" panose="020B0604020202020204" pitchFamily="34" charset="0"/>
                 <a:cs typeface="Arial" panose="020B0604020202020204" pitchFamily="34" charset="0"/>
               </a:rPr>
-              <a:t> = 2,056</a:t>
+              <a:t> = 3,587</a:t>
             </a:r>
           </a:p>
           <a:p>

</xml_diff>

<commit_message>
older updates (can ignore)
</commit_message>
<xml_diff>
--- a/Documents/Flowchart 090920.pptx
+++ b/Documents/Flowchart 090920.pptx
@@ -254,7 +254,7 @@
           <a:p>
             <a:fld id="{42F1B69B-8D3A-44C3-946A-BB0D05283811}" type="datetimeFigureOut">
               <a:rPr lang="en-US" smtClean="0"/>
-              <a:t>9/29/2020</a:t>
+              <a:t>10/4/2020</a:t>
             </a:fld>
             <a:endParaRPr lang="en-US"/>
           </a:p>
@@ -424,7 +424,7 @@
           <a:p>
             <a:fld id="{42F1B69B-8D3A-44C3-946A-BB0D05283811}" type="datetimeFigureOut">
               <a:rPr lang="en-US" smtClean="0"/>
-              <a:t>9/29/2020</a:t>
+              <a:t>10/4/2020</a:t>
             </a:fld>
             <a:endParaRPr lang="en-US"/>
           </a:p>
@@ -604,7 +604,7 @@
           <a:p>
             <a:fld id="{42F1B69B-8D3A-44C3-946A-BB0D05283811}" type="datetimeFigureOut">
               <a:rPr lang="en-US" smtClean="0"/>
-              <a:t>9/29/2020</a:t>
+              <a:t>10/4/2020</a:t>
             </a:fld>
             <a:endParaRPr lang="en-US"/>
           </a:p>
@@ -774,7 +774,7 @@
           <a:p>
             <a:fld id="{42F1B69B-8D3A-44C3-946A-BB0D05283811}" type="datetimeFigureOut">
               <a:rPr lang="en-US" smtClean="0"/>
-              <a:t>9/29/2020</a:t>
+              <a:t>10/4/2020</a:t>
             </a:fld>
             <a:endParaRPr lang="en-US"/>
           </a:p>
@@ -1018,7 +1018,7 @@
           <a:p>
             <a:fld id="{42F1B69B-8D3A-44C3-946A-BB0D05283811}" type="datetimeFigureOut">
               <a:rPr lang="en-US" smtClean="0"/>
-              <a:t>9/29/2020</a:t>
+              <a:t>10/4/2020</a:t>
             </a:fld>
             <a:endParaRPr lang="en-US"/>
           </a:p>
@@ -1250,7 +1250,7 @@
           <a:p>
             <a:fld id="{42F1B69B-8D3A-44C3-946A-BB0D05283811}" type="datetimeFigureOut">
               <a:rPr lang="en-US" smtClean="0"/>
-              <a:t>9/29/2020</a:t>
+              <a:t>10/4/2020</a:t>
             </a:fld>
             <a:endParaRPr lang="en-US"/>
           </a:p>
@@ -1617,7 +1617,7 @@
           <a:p>
             <a:fld id="{42F1B69B-8D3A-44C3-946A-BB0D05283811}" type="datetimeFigureOut">
               <a:rPr lang="en-US" smtClean="0"/>
-              <a:t>9/29/2020</a:t>
+              <a:t>10/4/2020</a:t>
             </a:fld>
             <a:endParaRPr lang="en-US"/>
           </a:p>
@@ -1735,7 +1735,7 @@
           <a:p>
             <a:fld id="{42F1B69B-8D3A-44C3-946A-BB0D05283811}" type="datetimeFigureOut">
               <a:rPr lang="en-US" smtClean="0"/>
-              <a:t>9/29/2020</a:t>
+              <a:t>10/4/2020</a:t>
             </a:fld>
             <a:endParaRPr lang="en-US"/>
           </a:p>
@@ -1830,7 +1830,7 @@
           <a:p>
             <a:fld id="{42F1B69B-8D3A-44C3-946A-BB0D05283811}" type="datetimeFigureOut">
               <a:rPr lang="en-US" smtClean="0"/>
-              <a:t>9/29/2020</a:t>
+              <a:t>10/4/2020</a:t>
             </a:fld>
             <a:endParaRPr lang="en-US"/>
           </a:p>
@@ -2107,7 +2107,7 @@
           <a:p>
             <a:fld id="{42F1B69B-8D3A-44C3-946A-BB0D05283811}" type="datetimeFigureOut">
               <a:rPr lang="en-US" smtClean="0"/>
-              <a:t>9/29/2020</a:t>
+              <a:t>10/4/2020</a:t>
             </a:fld>
             <a:endParaRPr lang="en-US"/>
           </a:p>
@@ -2364,7 +2364,7 @@
           <a:p>
             <a:fld id="{42F1B69B-8D3A-44C3-946A-BB0D05283811}" type="datetimeFigureOut">
               <a:rPr lang="en-US" smtClean="0"/>
-              <a:t>9/29/2020</a:t>
+              <a:t>10/4/2020</a:t>
             </a:fld>
             <a:endParaRPr lang="en-US"/>
           </a:p>
@@ -2577,7 +2577,7 @@
           <a:p>
             <a:fld id="{42F1B69B-8D3A-44C3-946A-BB0D05283811}" type="datetimeFigureOut">
               <a:rPr lang="en-US" smtClean="0"/>
-              <a:t>9/29/2020</a:t>
+              <a:t>10/4/2020</a:t>
             </a:fld>
             <a:endParaRPr lang="en-US"/>
           </a:p>
@@ -3040,7 +3040,7 @@
                 <a:latin typeface="Arial" panose="020B0604020202020204" pitchFamily="34" charset="0"/>
                 <a:cs typeface="Arial" panose="020B0604020202020204" pitchFamily="34" charset="0"/>
               </a:rPr>
-              <a:t>All participants, 1999-2010</a:t>
+              <a:t>All female participants, 1999-2010</a:t>
             </a:r>
           </a:p>
           <a:p>
@@ -3063,8 +3063,25 @@
                 <a:latin typeface="Arial" panose="020B0604020202020204" pitchFamily="34" charset="0"/>
                 <a:cs typeface="Arial" panose="020B0604020202020204" pitchFamily="34" charset="0"/>
               </a:rPr>
-              <a:t> = 62,160</a:t>
-            </a:r>
+              <a:t> </a:t>
+            </a:r>
+            <a:r>
+              <a:rPr lang="en-US" sz="1013">
+                <a:solidFill>
+                  <a:schemeClr val="tx1"/>
+                </a:solidFill>
+                <a:latin typeface="Arial" panose="020B0604020202020204" pitchFamily="34" charset="0"/>
+                <a:cs typeface="Arial" panose="020B0604020202020204" pitchFamily="34" charset="0"/>
+              </a:rPr>
+              <a:t>= 31,575</a:t>
+            </a:r>
+            <a:endParaRPr lang="en-US" sz="1013" dirty="0">
+              <a:solidFill>
+                <a:schemeClr val="tx1"/>
+              </a:solidFill>
+              <a:latin typeface="Arial" panose="020B0604020202020204" pitchFamily="34" charset="0"/>
+              <a:cs typeface="Arial" panose="020B0604020202020204" pitchFamily="34" charset="0"/>
+            </a:endParaRPr>
           </a:p>
         </p:txBody>
       </p:sp>

</xml_diff>